<commit_message>
created database, begun etl
</commit_message>
<xml_diff>
--- a/assignments/HR Database/project submission.pptx
+++ b/assignments/HR Database/project submission.pptx
@@ -1622,8 +1622,8 @@
         </p:nvSpPr>
         <p:spPr>
           <a:xfrm>
-            <a:off x="2104480" y="685800"/>
-            <a:ext cx="2649600" cy="3429000"/>
+            <a:off x="2105025" y="685800"/>
+            <a:ext cx="2649538" cy="3429000"/>
           </a:xfrm>
           <a:custGeom>
             <a:avLst/>
@@ -29449,47 +29449,32 @@
       </p:sp>
       <p:pic>
         <p:nvPicPr>
-          <p:cNvPr id="3076" name="Picture 4">
+          <p:cNvPr id="9" name="Picture 8" descr="Diagram&#10;&#10;Description automatically generated">
             <a:extLst>
               <a:ext uri="{FF2B5EF4-FFF2-40B4-BE49-F238E27FC236}">
-                <a16:creationId xmlns:a16="http://schemas.microsoft.com/office/drawing/2014/main" id="{06D58763-C949-4875-A73C-964F06E7AF78}"/>
+                <a16:creationId xmlns:a16="http://schemas.microsoft.com/office/drawing/2014/main" id="{B83D55DA-334D-4AA4-8E3C-46C82C8FECE0}"/>
               </a:ext>
             </a:extLst>
           </p:cNvPr>
           <p:cNvPicPr>
-            <a:picLocks noChangeAspect="1" noChangeArrowheads="1"/>
+            <a:picLocks noChangeAspect="1"/>
           </p:cNvPicPr>
           <p:nvPr/>
         </p:nvPicPr>
-        <p:blipFill rotWithShape="1">
-          <a:blip r:embed="rId3">
-            <a:extLst>
-              <a:ext uri="{28A0092B-C50C-407E-A947-70E740481C1C}">
-                <a14:useLocalDpi xmlns:a14="http://schemas.microsoft.com/office/drawing/2010/main" val="0"/>
-              </a:ext>
-            </a:extLst>
-          </a:blip>
-          <a:srcRect t="3846"/>
-          <a:stretch/>
+        <p:blipFill>
+          <a:blip r:embed="rId3"/>
+          <a:stretch>
+            <a:fillRect/>
+          </a:stretch>
         </p:blipFill>
-        <p:spPr bwMode="auto">
+        <p:spPr>
           <a:xfrm>
-            <a:off x="0" y="6130089"/>
-            <a:ext cx="7772400" cy="2743033"/>
+            <a:off x="0" y="6288967"/>
+            <a:ext cx="7772400" cy="2810455"/>
           </a:xfrm>
           <a:prstGeom prst="rect">
             <a:avLst/>
           </a:prstGeom>
-          <a:noFill/>
-          <a:extLst>
-            <a:ext uri="{909E8E84-426E-40DD-AFC4-6F175D3DCCD1}">
-              <a14:hiddenFill xmlns:a14="http://schemas.microsoft.com/office/drawing/2010/main">
-                <a:solidFill>
-                  <a:srgbClr val="FFFFFF"/>
-                </a:solidFill>
-              </a14:hiddenFill>
-            </a:ext>
-          </a:extLst>
         </p:spPr>
       </p:pic>
     </p:spTree>
@@ -29794,7 +29779,7 @@
               <a:buNone/>
             </a:pPr>
             <a:r>
-              <a:rPr lang="en" sz="1550">
+              <a:rPr lang="en" sz="1550" dirty="0">
                 <a:solidFill>
                   <a:srgbClr val="525C65"/>
                 </a:solidFill>
@@ -29808,7 +29793,7 @@
               </a:rPr>
               <a:t>In this step, you will be turning your database model into a physical database.</a:t>
             </a:r>
-            <a:endParaRPr sz="1550">
+            <a:endParaRPr sz="1550" dirty="0">
               <a:solidFill>
                 <a:srgbClr val="525C65"/>
               </a:solidFill>
@@ -29840,7 +29825,7 @@
               <a:buNone/>
             </a:pPr>
             <a:r>
-              <a:rPr lang="en" sz="1550" b="1">
+              <a:rPr lang="en" sz="1550" b="1" dirty="0">
                 <a:solidFill>
                   <a:srgbClr val="525C65"/>
                 </a:solidFill>
@@ -29854,7 +29839,7 @@
               </a:rPr>
               <a:t>You will:</a:t>
             </a:r>
-            <a:endParaRPr sz="1550" b="1">
+            <a:endParaRPr sz="1550" b="1" dirty="0">
               <a:solidFill>
                 <a:srgbClr val="525C65"/>
               </a:solidFill>
@@ -29886,7 +29871,7 @@
               <a:buChar char="●"/>
             </a:pPr>
             <a:r>
-              <a:rPr lang="en" sz="1550">
+              <a:rPr lang="en" sz="1550" dirty="0">
                 <a:solidFill>
                   <a:srgbClr val="525C65"/>
                 </a:solidFill>
@@ -29900,7 +29885,7 @@
               </a:rPr>
               <a:t>Create the database using SQL DDL commands</a:t>
             </a:r>
-            <a:endParaRPr sz="1550">
+            <a:endParaRPr sz="1550" dirty="0">
               <a:solidFill>
                 <a:srgbClr val="525C65"/>
               </a:solidFill>
@@ -29932,7 +29917,7 @@
               <a:buChar char="●"/>
             </a:pPr>
             <a:r>
-              <a:rPr lang="en" sz="1550">
+              <a:rPr lang="en" sz="1550" dirty="0">
                 <a:solidFill>
                   <a:srgbClr val="525C65"/>
                 </a:solidFill>
@@ -29946,7 +29931,7 @@
               </a:rPr>
               <a:t>Load the data into your database, utilizing flat file ETL</a:t>
             </a:r>
-            <a:endParaRPr sz="1550">
+            <a:endParaRPr sz="1550" dirty="0">
               <a:solidFill>
                 <a:srgbClr val="525C65"/>
               </a:solidFill>
@@ -29978,7 +29963,7 @@
               <a:buChar char="●"/>
             </a:pPr>
             <a:r>
-              <a:rPr lang="en" sz="1550">
+              <a:rPr lang="en" sz="1550" dirty="0">
                 <a:solidFill>
                   <a:srgbClr val="525C65"/>
                 </a:solidFill>
@@ -29992,7 +29977,7 @@
               </a:rPr>
               <a:t>Answer a series of questions using CRUD SQL commands to demonstrate your database was created and populated correctly</a:t>
             </a:r>
-            <a:endParaRPr sz="1550">
+            <a:endParaRPr sz="1550" dirty="0">
               <a:solidFill>
                 <a:srgbClr val="525C65"/>
               </a:solidFill>
@@ -30023,7 +30008,7 @@
               <a:buFont typeface="Arial"/>
               <a:buNone/>
             </a:pPr>
-            <a:endParaRPr sz="1350" b="1">
+            <a:endParaRPr sz="1350" b="1" dirty="0">
               <a:solidFill>
                 <a:srgbClr val="525C65"/>
               </a:solidFill>
@@ -30055,7 +30040,7 @@
               <a:buNone/>
             </a:pPr>
             <a:r>
-              <a:rPr lang="en" sz="1550" b="1">
+              <a:rPr lang="en" sz="1550" b="1" dirty="0">
                 <a:solidFill>
                   <a:srgbClr val="525C65"/>
                 </a:solidFill>
@@ -30069,7 +30054,7 @@
               </a:rPr>
               <a:t>Submission</a:t>
             </a:r>
-            <a:endParaRPr sz="1550" b="1">
+            <a:endParaRPr sz="1550" b="1" dirty="0">
               <a:solidFill>
                 <a:srgbClr val="525C65"/>
               </a:solidFill>
@@ -30101,7 +30086,7 @@
               <a:buNone/>
             </a:pPr>
             <a:r>
-              <a:rPr lang="en" sz="1550">
+              <a:rPr lang="en" sz="1550" dirty="0">
                 <a:solidFill>
                   <a:srgbClr val="525C65"/>
                 </a:solidFill>
@@ -30115,7 +30100,7 @@
               </a:rPr>
               <a:t>For this step, you will need to submit SQL files containing all DDL SQL scripts used to create the database.</a:t>
             </a:r>
-            <a:endParaRPr sz="1550">
+            <a:endParaRPr sz="1550" dirty="0">
               <a:solidFill>
                 <a:srgbClr val="525C65"/>
               </a:solidFill>
@@ -30146,7 +30131,7 @@
               <a:buFont typeface="Arial"/>
               <a:buNone/>
             </a:pPr>
-            <a:endParaRPr sz="1550">
+            <a:endParaRPr sz="1550" dirty="0">
               <a:solidFill>
                 <a:srgbClr val="525C65"/>
               </a:solidFill>
@@ -30178,7 +30163,7 @@
               <a:buNone/>
             </a:pPr>
             <a:r>
-              <a:rPr lang="en" sz="1550">
+              <a:rPr lang="en" sz="1550" dirty="0">
                 <a:solidFill>
                   <a:srgbClr val="525C65"/>
                 </a:solidFill>
@@ -30192,7 +30177,7 @@
               </a:rPr>
               <a:t>You will also have to submit screenshots showing CRUD commands, along with results for each of the questions found in the starter template.</a:t>
             </a:r>
-            <a:endParaRPr sz="1550">
+            <a:endParaRPr sz="1550" dirty="0">
               <a:solidFill>
                 <a:srgbClr val="525C65"/>
               </a:solidFill>
@@ -30223,7 +30208,7 @@
               <a:buFont typeface="Arial"/>
               <a:buNone/>
             </a:pPr>
-            <a:endParaRPr sz="1350">
+            <a:endParaRPr sz="1350" dirty="0">
               <a:solidFill>
                 <a:srgbClr val="525C65"/>
               </a:solidFill>
@@ -30254,7 +30239,7 @@
               <a:buFont typeface="Arial"/>
               <a:buNone/>
             </a:pPr>
-            <a:endParaRPr sz="1350">
+            <a:endParaRPr sz="1350" dirty="0">
               <a:solidFill>
                 <a:srgbClr val="525C65"/>
               </a:solidFill>
@@ -30286,7 +30271,7 @@
               <a:buNone/>
             </a:pPr>
             <a:r>
-              <a:rPr lang="en" sz="1550" b="1">
+              <a:rPr lang="en" sz="1550" b="1" dirty="0">
                 <a:solidFill>
                   <a:srgbClr val="525C65"/>
                 </a:solidFill>
@@ -30300,7 +30285,7 @@
               </a:rPr>
               <a:t>Hints</a:t>
             </a:r>
-            <a:endParaRPr sz="1550" b="1">
+            <a:endParaRPr sz="1550" b="1" dirty="0">
               <a:solidFill>
                 <a:srgbClr val="525C65"/>
               </a:solidFill>
@@ -30332,7 +30317,7 @@
               <a:buNone/>
             </a:pPr>
             <a:r>
-              <a:rPr lang="en" sz="1550">
+              <a:rPr lang="en" sz="1550" dirty="0">
                 <a:solidFill>
                   <a:srgbClr val="525C65"/>
                 </a:solidFill>
@@ -30346,7 +30331,7 @@
               </a:rPr>
               <a:t>Your DDL script will be graded by running the code you submit. Please ensure your SQL code runs properly!</a:t>
             </a:r>
-            <a:endParaRPr sz="1550">
+            <a:endParaRPr sz="1550" dirty="0">
               <a:solidFill>
                 <a:srgbClr val="525C65"/>
               </a:solidFill>
@@ -30377,7 +30362,7 @@
               <a:buFont typeface="Arial"/>
               <a:buNone/>
             </a:pPr>
-            <a:endParaRPr sz="1550">
+            <a:endParaRPr sz="1550" dirty="0">
               <a:solidFill>
                 <a:srgbClr val="525C65"/>
               </a:solidFill>
@@ -30409,7 +30394,7 @@
               <a:buNone/>
             </a:pPr>
             <a:r>
-              <a:rPr lang="en" sz="1550">
+              <a:rPr lang="en" sz="1550" dirty="0">
                 <a:solidFill>
                   <a:srgbClr val="525C65"/>
                 </a:solidFill>
@@ -30423,7 +30408,7 @@
               </a:rPr>
               <a:t>Foreign keys cannot be created on tables that do not exist yet, so it may be easier to create all tables in the database, then to go back and run modify statements on the tables to create foreign key constraints.</a:t>
             </a:r>
-            <a:endParaRPr sz="1550">
+            <a:endParaRPr sz="1550" dirty="0">
               <a:solidFill>
                 <a:srgbClr val="525C65"/>
               </a:solidFill>
@@ -30454,7 +30439,7 @@
               <a:buFont typeface="Arial"/>
               <a:buNone/>
             </a:pPr>
-            <a:endParaRPr sz="1550">
+            <a:endParaRPr sz="1550" dirty="0">
               <a:solidFill>
                 <a:srgbClr val="525C65"/>
               </a:solidFill>
@@ -30486,7 +30471,7 @@
               <a:buNone/>
             </a:pPr>
             <a:r>
-              <a:rPr lang="en" sz="1550">
+              <a:rPr lang="en" sz="1550" dirty="0">
                 <a:solidFill>
                   <a:srgbClr val="525C65"/>
                 </a:solidFill>
@@ -30501,7 +30486,7 @@
               <a:t>After running CRUD commands like update, insert, or delete, run a </a:t>
             </a:r>
             <a:r>
-              <a:rPr lang="en" sz="1550">
+              <a:rPr lang="en" sz="1550" dirty="0">
                 <a:solidFill>
                   <a:srgbClr val="525C65"/>
                 </a:solidFill>
@@ -30516,7 +30501,7 @@
               <a:t>SELECT*</a:t>
             </a:r>
             <a:r>
-              <a:rPr lang="en" sz="1550">
+              <a:rPr lang="en" sz="1550" dirty="0">
                 <a:solidFill>
                   <a:srgbClr val="525C65"/>
                 </a:solidFill>
@@ -30530,7 +30515,7 @@
               </a:rPr>
               <a:t> command on the affected table, so the reviewer can see the results of the command.</a:t>
             </a:r>
-            <a:endParaRPr sz="1050">
+            <a:endParaRPr sz="1050" dirty="0">
               <a:solidFill>
                 <a:srgbClr val="525C65"/>
               </a:solidFill>
@@ -30553,7 +30538,7 @@
               </a:spcAft>
               <a:buNone/>
             </a:pPr>
-            <a:endParaRPr sz="2200">
+            <a:endParaRPr sz="2200" dirty="0">
               <a:solidFill>
                 <a:srgbClr val="525C65"/>
               </a:solidFill>
@@ -30663,10 +30648,10 @@
               <a:buNone/>
             </a:pPr>
             <a:r>
-              <a:rPr lang="en" sz="1900"/>
+              <a:rPr lang="en" sz="1900" dirty="0"/>
               <a:t>Create a DDL SQL script capable of building the database you designed in Step 2</a:t>
             </a:r>
-            <a:endParaRPr sz="1900"/>
+            <a:endParaRPr sz="1900" dirty="0"/>
           </a:p>
           <a:p>
             <a:pPr marL="241300" marR="241300" lvl="0" indent="0" algn="l" rtl="0">
@@ -30687,7 +30672,7 @@
               <a:buNone/>
             </a:pPr>
             <a:r>
-              <a:rPr lang="en" sz="1350" b="1">
+              <a:rPr lang="en" sz="1350" b="1" dirty="0">
                 <a:solidFill>
                   <a:srgbClr val="2E3D49"/>
                 </a:solidFill>
@@ -30701,7 +30686,7 @@
               </a:rPr>
               <a:t>Hints</a:t>
             </a:r>
-            <a:endParaRPr sz="1350" b="1">
+            <a:endParaRPr sz="1350" b="1" dirty="0">
               <a:solidFill>
                 <a:srgbClr val="2E3D49"/>
               </a:solidFill>
@@ -30733,7 +30718,7 @@
               <a:buNone/>
             </a:pPr>
             <a:r>
-              <a:rPr lang="en" sz="1350">
+              <a:rPr lang="en" sz="1350" dirty="0">
                 <a:solidFill>
                   <a:srgbClr val="525C65"/>
                 </a:solidFill>
@@ -30747,7 +30732,7 @@
               </a:rPr>
               <a:t>The DDL script will be graded by running the code you submit. Please ensure your SQL code runs properly.</a:t>
             </a:r>
-            <a:endParaRPr sz="1350">
+            <a:endParaRPr sz="1350" dirty="0">
               <a:solidFill>
                 <a:srgbClr val="525C65"/>
               </a:solidFill>
@@ -30778,7 +30763,7 @@
               <a:buFont typeface="Arial"/>
               <a:buNone/>
             </a:pPr>
-            <a:endParaRPr sz="1350">
+            <a:endParaRPr sz="1350" dirty="0">
               <a:solidFill>
                 <a:srgbClr val="525C65"/>
               </a:solidFill>
@@ -30805,7 +30790,7 @@
               <a:buNone/>
             </a:pPr>
             <a:r>
-              <a:rPr lang="en" sz="1350">
+              <a:rPr lang="en" sz="1350" dirty="0">
                 <a:solidFill>
                   <a:srgbClr val="525C65"/>
                 </a:solidFill>
@@ -30819,7 +30804,7 @@
               </a:rPr>
               <a:t>Foreign keys cannot be created on tables that do not exist yet, so it may be easier to create all tables in the database, then to go back and run modify statements on the tables to create foreign key constraints.</a:t>
             </a:r>
-            <a:endParaRPr sz="1350">
+            <a:endParaRPr sz="1350" dirty="0">
               <a:solidFill>
                 <a:srgbClr val="525C65"/>
               </a:solidFill>
@@ -30845,7 +30830,7 @@
               </a:spcAft>
               <a:buNone/>
             </a:pPr>
-            <a:endParaRPr sz="1350">
+            <a:endParaRPr sz="1350" dirty="0">
               <a:solidFill>
                 <a:srgbClr val="2E3D49"/>
               </a:solidFill>
@@ -30877,7 +30862,7 @@
               <a:buNone/>
             </a:pPr>
             <a:r>
-              <a:rPr lang="en" sz="1350">
+              <a:rPr lang="en" sz="1350" dirty="0">
                 <a:solidFill>
                   <a:srgbClr val="FF0000"/>
                 </a:solidFill>
@@ -30891,7 +30876,7 @@
               </a:rPr>
               <a:t>Remember to submit the related SQL file as well, not just a screenshot (replace the below screenshot).</a:t>
             </a:r>
-            <a:endParaRPr sz="1350">
+            <a:endParaRPr sz="1350" dirty="0">
               <a:solidFill>
                 <a:srgbClr val="FF0000"/>
               </a:solidFill>
@@ -30914,7 +30899,7 @@
               </a:spcAft>
               <a:buNone/>
             </a:pPr>
-            <a:endParaRPr sz="1900"/>
+            <a:endParaRPr sz="1900" dirty="0"/>
           </a:p>
           <a:p>
             <a:pPr marL="457200" lvl="0" indent="0" algn="l" rtl="0">
@@ -30926,7 +30911,7 @@
               </a:spcAft>
               <a:buNone/>
             </a:pPr>
-            <a:endParaRPr sz="1900"/>
+            <a:endParaRPr sz="1900" dirty="0"/>
           </a:p>
           <a:p>
             <a:pPr marL="457200" lvl="0" indent="0" algn="l" rtl="0">
@@ -30938,7 +30923,7 @@
               </a:spcAft>
               <a:buNone/>
             </a:pPr>
-            <a:endParaRPr sz="1900"/>
+            <a:endParaRPr sz="1900" dirty="0"/>
           </a:p>
           <a:p>
             <a:pPr marL="457200" lvl="0" indent="0" algn="l" rtl="0">
@@ -30950,41 +30935,38 @@
               </a:spcAft>
               <a:buNone/>
             </a:pPr>
-            <a:endParaRPr sz="1900"/>
+            <a:endParaRPr sz="1900" dirty="0"/>
           </a:p>
         </p:txBody>
       </p:sp>
       <p:pic>
         <p:nvPicPr>
-          <p:cNvPr id="283" name="Google Shape;283;p67"/>
-          <p:cNvPicPr preferRelativeResize="0"/>
+          <p:cNvPr id="3" name="Picture 2" descr="Text&#10;&#10;Description automatically generated">
+            <a:extLst>
+              <a:ext uri="{FF2B5EF4-FFF2-40B4-BE49-F238E27FC236}">
+                <a16:creationId xmlns:a16="http://schemas.microsoft.com/office/drawing/2014/main" id="{0E11D84C-BA15-4022-B631-BFC4ECE3FACE}"/>
+              </a:ext>
+            </a:extLst>
+          </p:cNvPr>
+          <p:cNvPicPr>
+            <a:picLocks noChangeAspect="1"/>
+          </p:cNvPicPr>
           <p:nvPr/>
         </p:nvPicPr>
-        <p:blipFill rotWithShape="1">
-          <a:blip r:embed="rId3">
-            <a:alphaModFix/>
-          </a:blip>
-          <a:srcRect l="2818" t="2391"/>
-          <a:stretch/>
+        <p:blipFill>
+          <a:blip r:embed="rId3"/>
+          <a:stretch>
+            <a:fillRect/>
+          </a:stretch>
         </p:blipFill>
         <p:spPr>
           <a:xfrm>
-            <a:off x="1641775" y="5527975"/>
-            <a:ext cx="3823475" cy="3971125"/>
+            <a:off x="698603" y="5399362"/>
+            <a:ext cx="2952982" cy="4659038"/>
           </a:xfrm>
           <a:prstGeom prst="rect">
             <a:avLst/>
           </a:prstGeom>
-          <a:noFill/>
-          <a:ln w="9525" cap="flat" cmpd="sng">
-            <a:solidFill>
-              <a:schemeClr val="dk2"/>
-            </a:solidFill>
-            <a:prstDash val="solid"/>
-            <a:round/>
-            <a:headEnd type="none" w="sm" len="sm"/>
-            <a:tailEnd type="none" w="sm" len="sm"/>
-          </a:ln>
         </p:spPr>
       </p:pic>
     </p:spTree>
@@ -37540,22 +37522,16 @@
             </a:r>
           </a:p>
           <a:p>
-            <a:pPr marL="457200" lvl="0" indent="-349250" algn="l" rtl="0">
+            <a:pPr indent="-349250">
               <a:spcBef>
                 <a:spcPts val="1600"/>
               </a:spcBef>
-              <a:spcAft>
-                <a:spcPts val="0"/>
-              </a:spcAft>
               <a:buSzPts val="1900"/>
               <a:buFont typeface="Open Sans"/>
               <a:buChar char="●"/>
             </a:pPr>
             <a:r>
               <a:rPr lang="en" sz="1900" b="1" dirty="0">
-                <a:highlight>
-                  <a:srgbClr val="FFFF00"/>
-                </a:highlight>
                 <a:latin typeface="Open Sans"/>
                 <a:ea typeface="Open Sans"/>
                 <a:cs typeface="Open Sans"/>
@@ -37563,10 +37539,20 @@
               </a:rPr>
               <a:t>Database objects</a:t>
             </a:r>
-            <a:endParaRPr sz="1900" b="1" dirty="0">
-              <a:highlight>
-                <a:srgbClr val="FFFF00"/>
-              </a:highlight>
+          </a:p>
+          <a:p>
+            <a:pPr marL="107950" indent="0">
+              <a:spcBef>
+                <a:spcPts val="1600"/>
+              </a:spcBef>
+              <a:buSzPts val="1900"/>
+              <a:buNone/>
+            </a:pPr>
+            <a:r>
+              <a:rPr lang="en-NZ" sz="2000" dirty="0"/>
+              <a:t>List the database objects (tables, views, special procedures)  that will be created for the database. </a:t>
+            </a:r>
+            <a:endParaRPr lang="en" sz="1900" b="1" dirty="0">
               <a:latin typeface="Open Sans"/>
               <a:ea typeface="Open Sans"/>
               <a:cs typeface="Open Sans"/>
@@ -37574,7 +37560,7 @@
             </a:endParaRPr>
           </a:p>
           <a:p>
-            <a:pPr marL="457200" lvl="0" indent="0" algn="l" rtl="0">
+            <a:pPr marL="107950" lvl="0" indent="0" algn="l" rtl="0">
               <a:lnSpc>
                 <a:spcPct val="100000"/>
               </a:lnSpc>
@@ -37584,78 +37570,141 @@
               <a:spcAft>
                 <a:spcPts val="0"/>
               </a:spcAft>
+              <a:buSzPts val="1900"/>
               <a:buNone/>
             </a:pPr>
             <a:r>
-              <a:rPr lang="en" sz="1700" dirty="0">
-                <a:highlight>
-                  <a:srgbClr val="FFFF00"/>
-                </a:highlight>
+              <a:rPr lang="en-NZ" sz="1200" dirty="0">
+                <a:sym typeface="Open Sans"/>
               </a:rPr>
-              <a:t>List the database objects (tables, views, special procedures)  that will be created for the database. </a:t>
+              <a:t>Employee History</a:t>
             </a:r>
-            <a:endParaRPr sz="1700" dirty="0">
-              <a:highlight>
-                <a:srgbClr val="FFFF00"/>
-              </a:highlight>
-            </a:endParaRPr>
-          </a:p>
-          <a:p>
-            <a:pPr marL="457200" lvl="0" indent="0" algn="l" rtl="0">
-              <a:lnSpc>
-                <a:spcPct val="100000"/>
-              </a:lnSpc>
-              <a:spcBef>
-                <a:spcPts val="0"/>
-              </a:spcBef>
-              <a:spcAft>
-                <a:spcPts val="0"/>
-              </a:spcAft>
-              <a:buNone/>
-            </a:pPr>
-            <a:endParaRPr sz="1700" dirty="0">
-              <a:highlight>
-                <a:srgbClr val="FFFF00"/>
-              </a:highlight>
-            </a:endParaRPr>
-          </a:p>
-          <a:p>
-            <a:pPr marL="457200" lvl="0" indent="0" algn="l" rtl="0">
-              <a:lnSpc>
-                <a:spcPct val="100000"/>
-              </a:lnSpc>
-              <a:spcBef>
-                <a:spcPts val="0"/>
-              </a:spcBef>
-              <a:spcAft>
-                <a:spcPts val="0"/>
-              </a:spcAft>
+          </a:p>
+          <a:p>
+            <a:pPr marL="107950" lvl="0" indent="0" algn="l" rtl="0">
+              <a:lnSpc>
+                <a:spcPct val="100000"/>
+              </a:lnSpc>
+              <a:spcBef>
+                <a:spcPts val="1600"/>
+              </a:spcBef>
+              <a:spcAft>
+                <a:spcPts val="0"/>
+              </a:spcAft>
+              <a:buSzPts val="1900"/>
               <a:buNone/>
             </a:pPr>
             <a:r>
-              <a:rPr lang="en" sz="1700" dirty="0">
-                <a:highlight>
-                  <a:srgbClr val="FFFF00"/>
-                </a:highlight>
+              <a:rPr lang="en-NZ" sz="1200" dirty="0">
+                <a:sym typeface="Open Sans"/>
               </a:rPr>
-              <a:t>Hint - you may want to circle back to this answer after completing the logical ERD in step 2.</a:t>
+              <a:t>Education Level</a:t>
             </a:r>
-            <a:endParaRPr sz="1700" dirty="0">
-              <a:highlight>
-                <a:srgbClr val="FFFF00"/>
-              </a:highlight>
-            </a:endParaRPr>
-          </a:p>
-          <a:p>
-            <a:pPr marL="457200" lvl="0" indent="0" algn="l" rtl="0">
-              <a:spcBef>
-                <a:spcPts val="0"/>
-              </a:spcBef>
-              <a:spcAft>
-                <a:spcPts val="0"/>
-              </a:spcAft>
+          </a:p>
+          <a:p>
+            <a:pPr marL="107950" lvl="0" indent="0" algn="l" rtl="0">
+              <a:lnSpc>
+                <a:spcPct val="100000"/>
+              </a:lnSpc>
+              <a:spcBef>
+                <a:spcPts val="1600"/>
+              </a:spcBef>
+              <a:spcAft>
+                <a:spcPts val="0"/>
+              </a:spcAft>
+              <a:buSzPts val="1900"/>
               <a:buNone/>
             </a:pPr>
+            <a:r>
+              <a:rPr lang="en-NZ" sz="1200" dirty="0">
+                <a:sym typeface="Open Sans"/>
+              </a:rPr>
+              <a:t>Employee</a:t>
+            </a:r>
+          </a:p>
+          <a:p>
+            <a:pPr marL="107950" lvl="0" indent="0" algn="l" rtl="0">
+              <a:lnSpc>
+                <a:spcPct val="100000"/>
+              </a:lnSpc>
+              <a:spcBef>
+                <a:spcPts val="1600"/>
+              </a:spcBef>
+              <a:spcAft>
+                <a:spcPts val="0"/>
+              </a:spcAft>
+              <a:buSzPts val="1900"/>
+              <a:buNone/>
+            </a:pPr>
+            <a:r>
+              <a:rPr lang="en-NZ" sz="1200" dirty="0">
+                <a:sym typeface="Open Sans"/>
+              </a:rPr>
+              <a:t>Salary</a:t>
+            </a:r>
+          </a:p>
+          <a:p>
+            <a:pPr marL="107950" lvl="0" indent="0" algn="l" rtl="0">
+              <a:lnSpc>
+                <a:spcPct val="100000"/>
+              </a:lnSpc>
+              <a:spcBef>
+                <a:spcPts val="1600"/>
+              </a:spcBef>
+              <a:spcAft>
+                <a:spcPts val="0"/>
+              </a:spcAft>
+              <a:buSzPts val="1900"/>
+              <a:buNone/>
+            </a:pPr>
+            <a:r>
+              <a:rPr lang="en-NZ" sz="1200" dirty="0">
+                <a:sym typeface="Open Sans"/>
+              </a:rPr>
+              <a:t>Job</a:t>
+            </a:r>
+          </a:p>
+          <a:p>
+            <a:pPr marL="107950" lvl="0" indent="0" algn="l" rtl="0">
+              <a:lnSpc>
+                <a:spcPct val="100000"/>
+              </a:lnSpc>
+              <a:spcBef>
+                <a:spcPts val="1600"/>
+              </a:spcBef>
+              <a:spcAft>
+                <a:spcPts val="0"/>
+              </a:spcAft>
+              <a:buSzPts val="1900"/>
+              <a:buNone/>
+            </a:pPr>
+            <a:r>
+              <a:rPr lang="en-NZ" sz="1200" dirty="0">
+                <a:sym typeface="Open Sans"/>
+              </a:rPr>
+              <a:t>Department</a:t>
+            </a:r>
+          </a:p>
+          <a:p>
+            <a:pPr marL="107950" lvl="0" indent="0" algn="l" rtl="0">
+              <a:lnSpc>
+                <a:spcPct val="100000"/>
+              </a:lnSpc>
+              <a:spcBef>
+                <a:spcPts val="1600"/>
+              </a:spcBef>
+              <a:spcAft>
+                <a:spcPts val="0"/>
+              </a:spcAft>
+              <a:buSzPts val="1900"/>
+              <a:buNone/>
+            </a:pPr>
+            <a:r>
+              <a:rPr lang="en-NZ" sz="1200" dirty="0">
+                <a:sym typeface="Open Sans"/>
+              </a:rPr>
+              <a:t>Location</a:t>
+            </a:r>
             <a:endParaRPr sz="1900" dirty="0"/>
           </a:p>
           <a:p>
@@ -38014,18 +38063,6 @@
             <a:endParaRPr sz="1900" dirty="0"/>
           </a:p>
           <a:p>
-            <a:pPr marL="0" lvl="0" indent="0" algn="l" rtl="0">
-              <a:spcBef>
-                <a:spcPts val="1600"/>
-              </a:spcBef>
-              <a:spcAft>
-                <a:spcPts val="0"/>
-              </a:spcAft>
-              <a:buNone/>
-            </a:pPr>
-            <a:endParaRPr sz="1900" dirty="0"/>
-          </a:p>
-          <a:p>
             <a:pPr marL="457200" lvl="0" indent="-349250" algn="l" rtl="0">
               <a:spcBef>
                 <a:spcPts val="1600"/>
@@ -38122,36 +38159,6 @@
               <a:rPr lang="en" sz="1700" dirty="0"/>
               <a:t>how long does the data have to be kept for? 7 years</a:t>
             </a:r>
-            <a:endParaRPr sz="1700" dirty="0"/>
-          </a:p>
-          <a:p>
-            <a:pPr marL="457200" lvl="0" indent="0" algn="l" rtl="0">
-              <a:lnSpc>
-                <a:spcPct val="100000"/>
-              </a:lnSpc>
-              <a:spcBef>
-                <a:spcPts val="0"/>
-              </a:spcBef>
-              <a:spcAft>
-                <a:spcPts val="0"/>
-              </a:spcAft>
-              <a:buNone/>
-            </a:pPr>
-            <a:endParaRPr sz="1700" dirty="0"/>
-          </a:p>
-          <a:p>
-            <a:pPr marL="457200" lvl="0" indent="0" algn="l" rtl="0">
-              <a:lnSpc>
-                <a:spcPct val="100000"/>
-              </a:lnSpc>
-              <a:spcBef>
-                <a:spcPts val="0"/>
-              </a:spcBef>
-              <a:spcAft>
-                <a:spcPts val="0"/>
-              </a:spcAft>
-              <a:buNone/>
-            </a:pPr>
             <a:endParaRPr sz="1700" dirty="0"/>
           </a:p>
           <a:p>

</xml_diff>